<commit_message>
correcao da AC5 parte 1
</commit_message>
<xml_diff>
--- a/15 - Arquitetura de Negócio para cada Cenário.pptx
+++ b/15 - Arquitetura de Negócio para cada Cenário.pptx
@@ -499,11 +499,26 @@
   </pc:docChgLst>
   <pc:docChgLst>
     <pc:chgData name="Rafael Izukawa" userId="8cd3af5bce398e7e" providerId="LiveId" clId="{63C5D581-3F92-4D5D-8F87-503E35539F5A}"/>
-    <pc:docChg chg="modSld">
-      <pc:chgData name="Rafael Izukawa" userId="8cd3af5bce398e7e" providerId="LiveId" clId="{63C5D581-3F92-4D5D-8F87-503E35539F5A}" dt="2020-11-09T21:28:23.740" v="2" actId="20577"/>
+    <pc:docChg chg="undo custSel modSld">
+      <pc:chgData name="Rafael Izukawa" userId="8cd3af5bce398e7e" providerId="LiveId" clId="{63C5D581-3F92-4D5D-8F87-503E35539F5A}" dt="2020-11-19T00:02:04.265" v="32" actId="20577"/>
       <pc:docMkLst>
         <pc:docMk/>
       </pc:docMkLst>
+      <pc:sldChg chg="modSp mod">
+        <pc:chgData name="Rafael Izukawa" userId="8cd3af5bce398e7e" providerId="LiveId" clId="{63C5D581-3F92-4D5D-8F87-503E35539F5A}" dt="2020-11-19T00:02:04.265" v="32" actId="20577"/>
+        <pc:sldMkLst>
+          <pc:docMk/>
+          <pc:sldMk cId="357194282" sldId="259"/>
+        </pc:sldMkLst>
+        <pc:spChg chg="mod">
+          <ac:chgData name="Rafael Izukawa" userId="8cd3af5bce398e7e" providerId="LiveId" clId="{63C5D581-3F92-4D5D-8F87-503E35539F5A}" dt="2020-11-19T00:02:04.265" v="32" actId="20577"/>
+          <ac:spMkLst>
+            <pc:docMk/>
+            <pc:sldMk cId="357194282" sldId="259"/>
+            <ac:spMk id="13" creationId="{A9EE9E26-6BDB-40E3-AC86-DC7876C4BC17}"/>
+          </ac:spMkLst>
+        </pc:spChg>
+      </pc:sldChg>
       <pc:sldChg chg="modSp mod">
         <pc:chgData name="Rafael Izukawa" userId="8cd3af5bce398e7e" providerId="LiveId" clId="{63C5D581-3F92-4D5D-8F87-503E35539F5A}" dt="2020-11-09T21:28:23.740" v="2" actId="20577"/>
         <pc:sldMkLst>
@@ -805,7 +820,7 @@
           <a:p>
             <a:fld id="{E5032764-77C1-4722-B4BE-181502081668}" type="datetimeFigureOut">
               <a:rPr lang="pt-BR" smtClean="0"/>
-              <a:t>09/11/2020</a:t>
+              <a:t>18/11/2020</a:t>
             </a:fld>
             <a:endParaRPr lang="pt-BR"/>
           </a:p>
@@ -1003,7 +1018,7 @@
           <a:p>
             <a:fld id="{E5032764-77C1-4722-B4BE-181502081668}" type="datetimeFigureOut">
               <a:rPr lang="pt-BR" smtClean="0"/>
-              <a:t>09/11/2020</a:t>
+              <a:t>18/11/2020</a:t>
             </a:fld>
             <a:endParaRPr lang="pt-BR"/>
           </a:p>
@@ -1211,7 +1226,7 @@
           <a:p>
             <a:fld id="{E5032764-77C1-4722-B4BE-181502081668}" type="datetimeFigureOut">
               <a:rPr lang="pt-BR" smtClean="0"/>
-              <a:t>09/11/2020</a:t>
+              <a:t>18/11/2020</a:t>
             </a:fld>
             <a:endParaRPr lang="pt-BR"/>
           </a:p>
@@ -1409,7 +1424,7 @@
           <a:p>
             <a:fld id="{E5032764-77C1-4722-B4BE-181502081668}" type="datetimeFigureOut">
               <a:rPr lang="pt-BR" smtClean="0"/>
-              <a:t>09/11/2020</a:t>
+              <a:t>18/11/2020</a:t>
             </a:fld>
             <a:endParaRPr lang="pt-BR"/>
           </a:p>
@@ -1684,7 +1699,7 @@
           <a:p>
             <a:fld id="{E5032764-77C1-4722-B4BE-181502081668}" type="datetimeFigureOut">
               <a:rPr lang="pt-BR" smtClean="0"/>
-              <a:t>09/11/2020</a:t>
+              <a:t>18/11/2020</a:t>
             </a:fld>
             <a:endParaRPr lang="pt-BR"/>
           </a:p>
@@ -1949,7 +1964,7 @@
           <a:p>
             <a:fld id="{E5032764-77C1-4722-B4BE-181502081668}" type="datetimeFigureOut">
               <a:rPr lang="pt-BR" smtClean="0"/>
-              <a:t>09/11/2020</a:t>
+              <a:t>18/11/2020</a:t>
             </a:fld>
             <a:endParaRPr lang="pt-BR"/>
           </a:p>
@@ -2361,7 +2376,7 @@
           <a:p>
             <a:fld id="{E5032764-77C1-4722-B4BE-181502081668}" type="datetimeFigureOut">
               <a:rPr lang="pt-BR" smtClean="0"/>
-              <a:t>09/11/2020</a:t>
+              <a:t>18/11/2020</a:t>
             </a:fld>
             <a:endParaRPr lang="pt-BR"/>
           </a:p>
@@ -2502,7 +2517,7 @@
           <a:p>
             <a:fld id="{E5032764-77C1-4722-B4BE-181502081668}" type="datetimeFigureOut">
               <a:rPr lang="pt-BR" smtClean="0"/>
-              <a:t>09/11/2020</a:t>
+              <a:t>18/11/2020</a:t>
             </a:fld>
             <a:endParaRPr lang="pt-BR"/>
           </a:p>
@@ -2615,7 +2630,7 @@
           <a:p>
             <a:fld id="{E5032764-77C1-4722-B4BE-181502081668}" type="datetimeFigureOut">
               <a:rPr lang="pt-BR" smtClean="0"/>
-              <a:t>09/11/2020</a:t>
+              <a:t>18/11/2020</a:t>
             </a:fld>
             <a:endParaRPr lang="pt-BR"/>
           </a:p>
@@ -2926,7 +2941,7 @@
           <a:p>
             <a:fld id="{E5032764-77C1-4722-B4BE-181502081668}" type="datetimeFigureOut">
               <a:rPr lang="pt-BR" smtClean="0"/>
-              <a:t>09/11/2020</a:t>
+              <a:t>18/11/2020</a:t>
             </a:fld>
             <a:endParaRPr lang="pt-BR"/>
           </a:p>
@@ -3214,7 +3229,7 @@
           <a:p>
             <a:fld id="{E5032764-77C1-4722-B4BE-181502081668}" type="datetimeFigureOut">
               <a:rPr lang="pt-BR" smtClean="0"/>
-              <a:t>09/11/2020</a:t>
+              <a:t>18/11/2020</a:t>
             </a:fld>
             <a:endParaRPr lang="pt-BR"/>
           </a:p>
@@ -3455,7 +3470,7 @@
           <a:p>
             <a:fld id="{E5032764-77C1-4722-B4BE-181502081668}" type="datetimeFigureOut">
               <a:rPr lang="pt-BR" smtClean="0"/>
-              <a:t>09/11/2020</a:t>
+              <a:t>18/11/2020</a:t>
             </a:fld>
             <a:endParaRPr lang="pt-BR"/>
           </a:p>
@@ -4538,15 +4553,7 @@
             <a:pPr algn="ctr"/>
             <a:r>
               <a:rPr lang="pt-BR" sz="1400" dirty="0"/>
-              <a:t>Tratar </a:t>
-            </a:r>
-            <a:r>
-              <a:rPr lang="pt-BR" sz="1400"/>
-              <a:t>a compra </a:t>
-            </a:r>
-            <a:r>
-              <a:rPr lang="pt-BR" sz="1400" dirty="0"/>
-              <a:t>produto</a:t>
+              <a:t>Tratar venda do produto</a:t>
             </a:r>
           </a:p>
         </p:txBody>

</xml_diff>